<commit_message>
Single-cycle RV32I processor This is the final version of our single cycle processor.
Change: The name of ROM.v & RAM.v is changed to cache_instr.v & cache_data.v
</commit_message>
<xml_diff>
--- a/32bit_RiscV_design/Risc-V_CPU.pptx
+++ b/32bit_RiscV_design/Risc-V_CPU.pptx
@@ -8,6 +8,7 @@
     <p:sldId id="261" r:id="rId2"/>
     <p:sldId id="262" r:id="rId3"/>
     <p:sldId id="263" r:id="rId4"/>
+    <p:sldId id="264" r:id="rId5"/>
   </p:sldIdLst>
   <p:sldSz cx="12192000" cy="6858000"/>
   <p:notesSz cx="6858000" cy="9144000"/>
@@ -119,7 +120,7 @@
   <pc:docChgLst>
     <pc:chgData name="Laboratories Aperture Science" userId="4ef7ff3058e5cb20" providerId="LiveId" clId="{75C87B12-65F8-4F4F-BEF0-CFEE6D12BA6B}"/>
     <pc:docChg chg="undo custSel addSld delSld modSld">
-      <pc:chgData name="Laboratories Aperture Science" userId="4ef7ff3058e5cb20" providerId="LiveId" clId="{75C87B12-65F8-4F4F-BEF0-CFEE6D12BA6B}" dt="2024-05-06T12:08:36.498" v="168" actId="11529"/>
+      <pc:chgData name="Laboratories Aperture Science" userId="4ef7ff3058e5cb20" providerId="LiveId" clId="{75C87B12-65F8-4F4F-BEF0-CFEE6D12BA6B}" dt="2024-05-20T03:03:18.406" v="570" actId="113"/>
       <pc:docMkLst>
         <pc:docMk/>
       </pc:docMkLst>
@@ -493,6 +494,29 @@
           </ac:cxnSpMkLst>
         </pc:cxnChg>
       </pc:sldChg>
+      <pc:sldChg chg="addSp modSp new mod">
+        <pc:chgData name="Laboratories Aperture Science" userId="4ef7ff3058e5cb20" providerId="LiveId" clId="{75C87B12-65F8-4F4F-BEF0-CFEE6D12BA6B}" dt="2024-05-20T03:03:18.406" v="570" actId="113"/>
+        <pc:sldMkLst>
+          <pc:docMk/>
+          <pc:sldMk cId="895401886" sldId="264"/>
+        </pc:sldMkLst>
+        <pc:spChg chg="add mod">
+          <ac:chgData name="Laboratories Aperture Science" userId="4ef7ff3058e5cb20" providerId="LiveId" clId="{75C87B12-65F8-4F4F-BEF0-CFEE6D12BA6B}" dt="2024-05-20T03:00:11.505" v="273" actId="1076"/>
+          <ac:spMkLst>
+            <pc:docMk/>
+            <pc:sldMk cId="895401886" sldId="264"/>
+            <ac:spMk id="2" creationId="{B2DBEAE2-F290-62F3-7DDD-2EFE26D8072E}"/>
+          </ac:spMkLst>
+        </pc:spChg>
+        <pc:spChg chg="add mod">
+          <ac:chgData name="Laboratories Aperture Science" userId="4ef7ff3058e5cb20" providerId="LiveId" clId="{75C87B12-65F8-4F4F-BEF0-CFEE6D12BA6B}" dt="2024-05-20T03:03:18.406" v="570" actId="113"/>
+          <ac:spMkLst>
+            <pc:docMk/>
+            <pc:sldMk cId="895401886" sldId="264"/>
+            <ac:spMk id="3" creationId="{19F66EC0-2EDF-A243-E1F3-CCFAB2CCF07F}"/>
+          </ac:spMkLst>
+        </pc:spChg>
+      </pc:sldChg>
     </pc:docChg>
   </pc:docChgLst>
 </pc:chgInfo>
@@ -645,7 +669,7 @@
           <a:p>
             <a:fld id="{3DA55360-DDDC-4346-A6FA-426842ECECBE}" type="datetimeFigureOut">
               <a:rPr kumimoji="1" lang="zh-CN" altLang="en-US" smtClean="0"/>
-              <a:t>2024/5/6</a:t>
+              <a:t>2024/5/20</a:t>
             </a:fld>
             <a:endParaRPr kumimoji="1" lang="zh-CN" altLang="en-US"/>
           </a:p>
@@ -843,7 +867,7 @@
           <a:p>
             <a:fld id="{3DA55360-DDDC-4346-A6FA-426842ECECBE}" type="datetimeFigureOut">
               <a:rPr kumimoji="1" lang="zh-CN" altLang="en-US" smtClean="0"/>
-              <a:t>2024/5/6</a:t>
+              <a:t>2024/5/20</a:t>
             </a:fld>
             <a:endParaRPr kumimoji="1" lang="zh-CN" altLang="en-US"/>
           </a:p>
@@ -1051,7 +1075,7 @@
           <a:p>
             <a:fld id="{3DA55360-DDDC-4346-A6FA-426842ECECBE}" type="datetimeFigureOut">
               <a:rPr kumimoji="1" lang="zh-CN" altLang="en-US" smtClean="0"/>
-              <a:t>2024/5/6</a:t>
+              <a:t>2024/5/20</a:t>
             </a:fld>
             <a:endParaRPr kumimoji="1" lang="zh-CN" altLang="en-US"/>
           </a:p>
@@ -1249,7 +1273,7 @@
           <a:p>
             <a:fld id="{3DA55360-DDDC-4346-A6FA-426842ECECBE}" type="datetimeFigureOut">
               <a:rPr kumimoji="1" lang="zh-CN" altLang="en-US" smtClean="0"/>
-              <a:t>2024/5/6</a:t>
+              <a:t>2024/5/20</a:t>
             </a:fld>
             <a:endParaRPr kumimoji="1" lang="zh-CN" altLang="en-US"/>
           </a:p>
@@ -1524,7 +1548,7 @@
           <a:p>
             <a:fld id="{3DA55360-DDDC-4346-A6FA-426842ECECBE}" type="datetimeFigureOut">
               <a:rPr kumimoji="1" lang="zh-CN" altLang="en-US" smtClean="0"/>
-              <a:t>2024/5/6</a:t>
+              <a:t>2024/5/20</a:t>
             </a:fld>
             <a:endParaRPr kumimoji="1" lang="zh-CN" altLang="en-US"/>
           </a:p>
@@ -1789,7 +1813,7 @@
           <a:p>
             <a:fld id="{3DA55360-DDDC-4346-A6FA-426842ECECBE}" type="datetimeFigureOut">
               <a:rPr kumimoji="1" lang="zh-CN" altLang="en-US" smtClean="0"/>
-              <a:t>2024/5/6</a:t>
+              <a:t>2024/5/20</a:t>
             </a:fld>
             <a:endParaRPr kumimoji="1" lang="zh-CN" altLang="en-US"/>
           </a:p>
@@ -2201,7 +2225,7 @@
           <a:p>
             <a:fld id="{3DA55360-DDDC-4346-A6FA-426842ECECBE}" type="datetimeFigureOut">
               <a:rPr kumimoji="1" lang="zh-CN" altLang="en-US" smtClean="0"/>
-              <a:t>2024/5/6</a:t>
+              <a:t>2024/5/20</a:t>
             </a:fld>
             <a:endParaRPr kumimoji="1" lang="zh-CN" altLang="en-US"/>
           </a:p>
@@ -2342,7 +2366,7 @@
           <a:p>
             <a:fld id="{3DA55360-DDDC-4346-A6FA-426842ECECBE}" type="datetimeFigureOut">
               <a:rPr kumimoji="1" lang="zh-CN" altLang="en-US" smtClean="0"/>
-              <a:t>2024/5/6</a:t>
+              <a:t>2024/5/20</a:t>
             </a:fld>
             <a:endParaRPr kumimoji="1" lang="zh-CN" altLang="en-US"/>
           </a:p>
@@ -2455,7 +2479,7 @@
           <a:p>
             <a:fld id="{3DA55360-DDDC-4346-A6FA-426842ECECBE}" type="datetimeFigureOut">
               <a:rPr kumimoji="1" lang="zh-CN" altLang="en-US" smtClean="0"/>
-              <a:t>2024/5/6</a:t>
+              <a:t>2024/5/20</a:t>
             </a:fld>
             <a:endParaRPr kumimoji="1" lang="zh-CN" altLang="en-US"/>
           </a:p>
@@ -2766,7 +2790,7 @@
           <a:p>
             <a:fld id="{3DA55360-DDDC-4346-A6FA-426842ECECBE}" type="datetimeFigureOut">
               <a:rPr kumimoji="1" lang="zh-CN" altLang="en-US" smtClean="0"/>
-              <a:t>2024/5/6</a:t>
+              <a:t>2024/5/20</a:t>
             </a:fld>
             <a:endParaRPr kumimoji="1" lang="zh-CN" altLang="en-US"/>
           </a:p>
@@ -3054,7 +3078,7 @@
           <a:p>
             <a:fld id="{3DA55360-DDDC-4346-A6FA-426842ECECBE}" type="datetimeFigureOut">
               <a:rPr kumimoji="1" lang="zh-CN" altLang="en-US" smtClean="0"/>
-              <a:t>2024/5/6</a:t>
+              <a:t>2024/5/20</a:t>
             </a:fld>
             <a:endParaRPr kumimoji="1" lang="zh-CN" altLang="en-US"/>
           </a:p>
@@ -3295,7 +3319,7 @@
           <a:p>
             <a:fld id="{3DA55360-DDDC-4346-A6FA-426842ECECBE}" type="datetimeFigureOut">
               <a:rPr kumimoji="1" lang="zh-CN" altLang="en-US" smtClean="0"/>
-              <a:t>2024/5/6</a:t>
+              <a:t>2024/5/20</a:t>
             </a:fld>
             <a:endParaRPr kumimoji="1" lang="zh-CN" altLang="en-US"/>
           </a:p>
@@ -8622,6 +8646,423 @@
 </p:sld>
 </file>
 
+<file path=ppt/slides/slide4.xml><?xml version="1.0" encoding="utf-8"?>
+<p:sld xmlns:a="http://schemas.openxmlformats.org/drawingml/2006/main" xmlns:r="http://schemas.openxmlformats.org/officeDocument/2006/relationships" xmlns:p="http://schemas.openxmlformats.org/presentationml/2006/main">
+  <p:cSld>
+    <p:spTree>
+      <p:nvGrpSpPr>
+        <p:cNvPr id="1" name=""/>
+        <p:cNvGrpSpPr/>
+        <p:nvPr/>
+      </p:nvGrpSpPr>
+      <p:grpSpPr>
+        <a:xfrm>
+          <a:off x="0" y="0"/>
+          <a:ext cx="0" cy="0"/>
+          <a:chOff x="0" y="0"/>
+          <a:chExt cx="0" cy="0"/>
+        </a:xfrm>
+      </p:grpSpPr>
+      <p:sp>
+        <p:nvSpPr>
+          <p:cNvPr id="2" name="TextBox 1">
+            <a:extLst>
+              <a:ext uri="{FF2B5EF4-FFF2-40B4-BE49-F238E27FC236}">
+                <a16:creationId xmlns:a16="http://schemas.microsoft.com/office/drawing/2014/main" id="{B2DBEAE2-F290-62F3-7DDD-2EFE26D8072E}"/>
+              </a:ext>
+            </a:extLst>
+          </p:cNvPr>
+          <p:cNvSpPr txBox="1"/>
+          <p:nvPr/>
+        </p:nvSpPr>
+        <p:spPr>
+          <a:xfrm>
+            <a:off x="1567356" y="1592495"/>
+            <a:ext cx="9057288" cy="369332"/>
+          </a:xfrm>
+          <a:prstGeom prst="rect">
+            <a:avLst/>
+          </a:prstGeom>
+          <a:noFill/>
+        </p:spPr>
+        <p:txBody>
+          <a:bodyPr wrap="none" rtlCol="0">
+            <a:spAutoFit/>
+          </a:bodyPr>
+          <a:lstStyle/>
+          <a:p>
+            <a:r>
+              <a:rPr lang="en-CN" dirty="0"/>
+              <a:t>取指</a:t>
+            </a:r>
+            <a:r>
+              <a:rPr lang="zh-CN" altLang="en-US" dirty="0"/>
+              <a:t>（</a:t>
+            </a:r>
+            <a:r>
+              <a:rPr lang="en-US" altLang="zh-CN" dirty="0"/>
+              <a:t>Fetch</a:t>
+            </a:r>
+            <a:r>
+              <a:rPr lang="zh-CN" altLang="en-US" dirty="0"/>
+              <a:t>） 译码（</a:t>
+            </a:r>
+            <a:r>
+              <a:rPr lang="en-US" altLang="zh-CN" dirty="0"/>
+              <a:t>Decode</a:t>
+            </a:r>
+            <a:r>
+              <a:rPr lang="zh-CN" altLang="en-US" dirty="0"/>
+              <a:t>） 执行（</a:t>
+            </a:r>
+            <a:r>
+              <a:rPr lang="en-US" altLang="zh-CN" dirty="0"/>
+              <a:t>Execute</a:t>
+            </a:r>
+            <a:r>
+              <a:rPr lang="zh-CN" altLang="en-US" dirty="0"/>
+              <a:t>） 访存（</a:t>
+            </a:r>
+            <a:r>
+              <a:rPr lang="en-US" altLang="zh-CN" dirty="0"/>
+              <a:t>Memory</a:t>
+            </a:r>
+            <a:r>
+              <a:rPr lang="zh-CN" altLang="en-US" dirty="0"/>
+              <a:t>） 写回（</a:t>
+            </a:r>
+            <a:r>
+              <a:rPr lang="en-US" altLang="zh-CN" dirty="0"/>
+              <a:t>Write</a:t>
+            </a:r>
+            <a:r>
+              <a:rPr lang="zh-CN" altLang="en-US" dirty="0"/>
+              <a:t> </a:t>
+            </a:r>
+            <a:r>
+              <a:rPr lang="en-US" altLang="zh-CN" dirty="0"/>
+              <a:t>Back</a:t>
+            </a:r>
+            <a:r>
+              <a:rPr lang="zh-CN" altLang="en-US" dirty="0"/>
+              <a:t>） </a:t>
+            </a:r>
+            <a:endParaRPr lang="en-CN" dirty="0"/>
+          </a:p>
+        </p:txBody>
+      </p:sp>
+      <p:sp>
+        <p:nvSpPr>
+          <p:cNvPr id="3" name="TextBox 2">
+            <a:extLst>
+              <a:ext uri="{FF2B5EF4-FFF2-40B4-BE49-F238E27FC236}">
+                <a16:creationId xmlns:a16="http://schemas.microsoft.com/office/drawing/2014/main" id="{19F66EC0-2EDF-A243-E1F3-CCFAB2CCF07F}"/>
+              </a:ext>
+            </a:extLst>
+          </p:cNvPr>
+          <p:cNvSpPr txBox="1"/>
+          <p:nvPr/>
+        </p:nvSpPr>
+        <p:spPr>
+          <a:xfrm>
+            <a:off x="945223" y="2065107"/>
+            <a:ext cx="9203160" cy="3139321"/>
+          </a:xfrm>
+          <a:prstGeom prst="rect">
+            <a:avLst/>
+          </a:prstGeom>
+          <a:noFill/>
+        </p:spPr>
+        <p:txBody>
+          <a:bodyPr wrap="none" rtlCol="0">
+            <a:spAutoFit/>
+          </a:bodyPr>
+          <a:lstStyle/>
+          <a:p>
+            <a:r>
+              <a:rPr lang="en-US" altLang="zh-CN" dirty="0"/>
+              <a:t>1	</a:t>
+            </a:r>
+            <a:r>
+              <a:rPr lang="zh-CN" altLang="en-US" dirty="0"/>
+              <a:t>指令</a:t>
+            </a:r>
+            <a:r>
+              <a:rPr lang="en-US" altLang="zh-CN" b="1" dirty="0"/>
+              <a:t>1</a:t>
+            </a:r>
+          </a:p>
+          <a:p>
+            <a:endParaRPr lang="en-US" altLang="zh-CN" dirty="0"/>
+          </a:p>
+          <a:p>
+            <a:r>
+              <a:rPr lang="en-US" altLang="zh-CN" dirty="0"/>
+              <a:t>2	</a:t>
+            </a:r>
+            <a:r>
+              <a:rPr lang="zh-CN" altLang="en-US" dirty="0"/>
+              <a:t>指令</a:t>
+            </a:r>
+            <a:r>
+              <a:rPr lang="en-US" altLang="zh-CN" b="1" dirty="0"/>
+              <a:t>2</a:t>
+            </a:r>
+            <a:r>
+              <a:rPr lang="en-US" altLang="zh-CN" dirty="0"/>
+              <a:t>		</a:t>
+            </a:r>
+            <a:r>
+              <a:rPr lang="zh-CN" altLang="en-US" dirty="0"/>
+              <a:t>指令</a:t>
+            </a:r>
+            <a:r>
+              <a:rPr lang="en-US" altLang="zh-CN" b="1" dirty="0"/>
+              <a:t>1</a:t>
+            </a:r>
+          </a:p>
+          <a:p>
+            <a:endParaRPr lang="en-US" altLang="zh-CN" dirty="0"/>
+          </a:p>
+          <a:p>
+            <a:r>
+              <a:rPr lang="en-US" altLang="zh-CN" dirty="0"/>
+              <a:t>3	</a:t>
+            </a:r>
+            <a:r>
+              <a:rPr lang="zh-CN" altLang="en-US" dirty="0"/>
+              <a:t>指令</a:t>
+            </a:r>
+            <a:r>
+              <a:rPr lang="en-US" altLang="zh-CN" b="1" dirty="0"/>
+              <a:t>3</a:t>
+            </a:r>
+            <a:r>
+              <a:rPr lang="en-US" altLang="zh-CN" dirty="0"/>
+              <a:t>		</a:t>
+            </a:r>
+            <a:r>
+              <a:rPr lang="zh-CN" altLang="en-US" dirty="0"/>
+              <a:t>指令</a:t>
+            </a:r>
+            <a:r>
+              <a:rPr lang="en-US" altLang="zh-CN" b="1" dirty="0"/>
+              <a:t>2</a:t>
+            </a:r>
+            <a:r>
+              <a:rPr lang="en-US" altLang="zh-CN" dirty="0"/>
+              <a:t>		</a:t>
+            </a:r>
+            <a:r>
+              <a:rPr lang="zh-CN" altLang="en-US" dirty="0"/>
+              <a:t>指令</a:t>
+            </a:r>
+            <a:r>
+              <a:rPr lang="en-US" altLang="zh-CN" b="1" dirty="0"/>
+              <a:t>1</a:t>
+            </a:r>
+          </a:p>
+          <a:p>
+            <a:endParaRPr lang="en-US" dirty="0"/>
+          </a:p>
+          <a:p>
+            <a:r>
+              <a:rPr lang="en-US" altLang="zh-CN" dirty="0"/>
+              <a:t>4	</a:t>
+            </a:r>
+            <a:r>
+              <a:rPr lang="zh-CN" altLang="en-US" dirty="0"/>
+              <a:t>指令</a:t>
+            </a:r>
+            <a:r>
+              <a:rPr lang="en-US" altLang="zh-CN" b="1" dirty="0"/>
+              <a:t>4</a:t>
+            </a:r>
+            <a:r>
+              <a:rPr lang="en-US" altLang="zh-CN" dirty="0"/>
+              <a:t>		</a:t>
+            </a:r>
+            <a:r>
+              <a:rPr lang="zh-CN" altLang="en-US" dirty="0"/>
+              <a:t>指令</a:t>
+            </a:r>
+            <a:r>
+              <a:rPr lang="en-US" altLang="zh-CN" b="1" dirty="0"/>
+              <a:t>3</a:t>
+            </a:r>
+            <a:r>
+              <a:rPr lang="en-US" altLang="zh-CN" dirty="0"/>
+              <a:t>		</a:t>
+            </a:r>
+            <a:r>
+              <a:rPr lang="zh-CN" altLang="en-US" dirty="0"/>
+              <a:t>指令</a:t>
+            </a:r>
+            <a:r>
+              <a:rPr lang="en-US" altLang="zh-CN" b="1" dirty="0"/>
+              <a:t>2</a:t>
+            </a:r>
+            <a:r>
+              <a:rPr lang="en-US" altLang="zh-CN" dirty="0"/>
+              <a:t>		</a:t>
+            </a:r>
+            <a:r>
+              <a:rPr lang="zh-CN" altLang="en-US" dirty="0"/>
+              <a:t>指令</a:t>
+            </a:r>
+            <a:r>
+              <a:rPr lang="en-US" altLang="zh-CN" b="1" dirty="0"/>
+              <a:t>1</a:t>
+            </a:r>
+            <a:r>
+              <a:rPr lang="en-US" altLang="zh-CN" dirty="0"/>
+              <a:t>		</a:t>
+            </a:r>
+            <a:endParaRPr lang="en-CN" altLang="zh-CN" dirty="0"/>
+          </a:p>
+          <a:p>
+            <a:endParaRPr lang="en-CN" dirty="0"/>
+          </a:p>
+          <a:p>
+            <a:r>
+              <a:rPr lang="en-US" altLang="zh-CN" dirty="0"/>
+              <a:t>5	</a:t>
+            </a:r>
+            <a:r>
+              <a:rPr lang="zh-CN" altLang="en-US" dirty="0"/>
+              <a:t>指令</a:t>
+            </a:r>
+            <a:r>
+              <a:rPr lang="en-US" altLang="zh-CN" b="1" dirty="0"/>
+              <a:t>5</a:t>
+            </a:r>
+            <a:r>
+              <a:rPr lang="en-US" altLang="zh-CN" dirty="0"/>
+              <a:t>		</a:t>
+            </a:r>
+            <a:r>
+              <a:rPr lang="zh-CN" altLang="en-US" dirty="0"/>
+              <a:t>指令</a:t>
+            </a:r>
+            <a:r>
+              <a:rPr lang="en-US" altLang="zh-CN" b="1" dirty="0"/>
+              <a:t>4</a:t>
+            </a:r>
+            <a:r>
+              <a:rPr lang="en-US" altLang="zh-CN" dirty="0"/>
+              <a:t>		</a:t>
+            </a:r>
+            <a:r>
+              <a:rPr lang="zh-CN" altLang="en-US" dirty="0"/>
+              <a:t>指令</a:t>
+            </a:r>
+            <a:r>
+              <a:rPr lang="en-US" altLang="zh-CN" b="1" dirty="0"/>
+              <a:t>3</a:t>
+            </a:r>
+            <a:r>
+              <a:rPr lang="en-US" altLang="zh-CN" dirty="0"/>
+              <a:t>		</a:t>
+            </a:r>
+            <a:r>
+              <a:rPr lang="zh-CN" altLang="en-US" dirty="0"/>
+              <a:t>指令</a:t>
+            </a:r>
+            <a:r>
+              <a:rPr lang="en-US" altLang="zh-CN" b="1" dirty="0"/>
+              <a:t>2</a:t>
+            </a:r>
+            <a:r>
+              <a:rPr lang="en-US" altLang="zh-CN" dirty="0"/>
+              <a:t>		</a:t>
+            </a:r>
+            <a:r>
+              <a:rPr lang="zh-CN" altLang="en-US" dirty="0"/>
+              <a:t>指令</a:t>
+            </a:r>
+            <a:r>
+              <a:rPr lang="en-US" altLang="zh-CN" b="1" dirty="0"/>
+              <a:t>1</a:t>
+            </a:r>
+            <a:endParaRPr lang="en-CN" altLang="zh-CN" b="1" dirty="0"/>
+          </a:p>
+          <a:p>
+            <a:endParaRPr lang="en-CN" dirty="0"/>
+          </a:p>
+          <a:p>
+            <a:r>
+              <a:rPr lang="en-US" altLang="zh-CN" dirty="0"/>
+              <a:t>6	</a:t>
+            </a:r>
+            <a:r>
+              <a:rPr lang="zh-CN" altLang="en-US" dirty="0"/>
+              <a:t>指令</a:t>
+            </a:r>
+            <a:r>
+              <a:rPr lang="en-US" altLang="zh-CN" b="1" dirty="0"/>
+              <a:t>6</a:t>
+            </a:r>
+            <a:r>
+              <a:rPr lang="en-US" altLang="zh-CN" dirty="0"/>
+              <a:t>		</a:t>
+            </a:r>
+            <a:r>
+              <a:rPr lang="zh-CN" altLang="en-US" dirty="0"/>
+              <a:t>指令</a:t>
+            </a:r>
+            <a:r>
+              <a:rPr lang="en-US" altLang="zh-CN" b="1" dirty="0"/>
+              <a:t>5</a:t>
+            </a:r>
+            <a:r>
+              <a:rPr lang="en-US" altLang="zh-CN" dirty="0"/>
+              <a:t>		</a:t>
+            </a:r>
+            <a:r>
+              <a:rPr lang="zh-CN" altLang="en-US" dirty="0"/>
+              <a:t>指令</a:t>
+            </a:r>
+            <a:r>
+              <a:rPr lang="en-US" altLang="zh-CN" dirty="0"/>
+              <a:t>4		</a:t>
+            </a:r>
+            <a:r>
+              <a:rPr lang="zh-CN" altLang="en-US" dirty="0"/>
+              <a:t>指令</a:t>
+            </a:r>
+            <a:r>
+              <a:rPr lang="en-US" altLang="zh-CN" b="1" dirty="0"/>
+              <a:t>3</a:t>
+            </a:r>
+            <a:r>
+              <a:rPr lang="en-US" altLang="zh-CN" dirty="0"/>
+              <a:t>		</a:t>
+            </a:r>
+            <a:r>
+              <a:rPr lang="zh-CN" altLang="en-US" dirty="0"/>
+              <a:t>指令</a:t>
+            </a:r>
+            <a:r>
+              <a:rPr lang="en-US" altLang="zh-CN" b="1" dirty="0"/>
+              <a:t>2</a:t>
+            </a:r>
+            <a:endParaRPr lang="en-US" b="1" dirty="0"/>
+          </a:p>
+        </p:txBody>
+      </p:sp>
+    </p:spTree>
+    <p:extLst>
+      <p:ext uri="{BB962C8B-B14F-4D97-AF65-F5344CB8AC3E}">
+        <p14:creationId xmlns:p14="http://schemas.microsoft.com/office/powerpoint/2010/main" val="895401886"/>
+      </p:ext>
+    </p:extLst>
+  </p:cSld>
+  <p:clrMapOvr>
+    <a:masterClrMapping/>
+  </p:clrMapOvr>
+</p:sld>
+</file>
+
 <file path=ppt/theme/theme1.xml><?xml version="1.0" encoding="utf-8"?>
 <a:theme xmlns:a="http://schemas.openxmlformats.org/drawingml/2006/main" name="Office 主题​​">
   <a:themeElements>

</xml_diff>